<commit_message>
implement verbose mode in class PrintJob; spelling corrections; update documentation
</commit_message>
<xml_diff>
--- a/examples/solar_system_example/pptx/output.pptx
+++ b/examples/solar_system_example/pptx/output.pptx
@@ -358,7 +358,7 @@
             <c:idx val="1"/>
             <c:spPr>
               <a:solidFill>
-                <a:srgbClr val="2d61db"/>
+                <a:srgbClr val="c4811b"/>
               </a:solidFill>
             </c:spPr>
           </c:dPt>
@@ -366,7 +366,7 @@
             <c:idx val="2"/>
             <c:spPr>
               <a:solidFill>
-                <a:srgbClr val="d0b4c5"/>
+                <a:srgbClr val="76f5ce"/>
               </a:solidFill>
             </c:spPr>
           </c:dPt>
@@ -374,7 +374,7 @@
             <c:idx val="3"/>
             <c:spPr>
               <a:solidFill>
-                <a:srgbClr val="83382a"/>
+                <a:srgbClr val="5e0f68"/>
               </a:solidFill>
             </c:spPr>
           </c:dPt>
@@ -382,7 +382,7 @@
             <c:idx val="4"/>
             <c:spPr>
               <a:solidFill>
-                <a:srgbClr val="9aabc3"/>
+                <a:srgbClr val="4c2b13"/>
               </a:solidFill>
             </c:spPr>
           </c:dPt>
@@ -390,7 +390,7 @@
             <c:idx val="5"/>
             <c:spPr>
               <a:solidFill>
-                <a:srgbClr val="6617c0"/>
+                <a:srgbClr val="aaffaa"/>
               </a:solidFill>
             </c:spPr>
           </c:dPt>
@@ -398,7 +398,7 @@
             <c:idx val="6"/>
             <c:spPr>
               <a:solidFill>
-                <a:srgbClr val="35adfa"/>
+                <a:srgbClr val="c76e06"/>
               </a:solidFill>
             </c:spPr>
           </c:dPt>
@@ -406,7 +406,7 @@
             <c:idx val="7"/>
             <c:spPr>
               <a:solidFill>
-                <a:srgbClr val="75e6a8"/>
+                <a:srgbClr val="82b317"/>
               </a:solidFill>
             </c:spPr>
           </c:dPt>
@@ -414,7 +414,7 @@
             <c:idx val="8"/>
             <c:spPr>
               <a:solidFill>
-                <a:srgbClr val="6c9eab"/>
+                <a:srgbClr val="f483d4"/>
               </a:solidFill>
             </c:spPr>
           </c:dPt>
@@ -422,7 +422,7 @@
             <c:idx val="9"/>
             <c:spPr>
               <a:solidFill>
-                <a:srgbClr val="c8cdd8"/>
+                <a:srgbClr val="c8801e"/>
               </a:solidFill>
             </c:spPr>
           </c:dPt>
@@ -430,7 +430,7 @@
             <c:idx val="10"/>
             <c:spPr>
               <a:solidFill>
-                <a:srgbClr val="e10690"/>
+                <a:srgbClr val="015fa9"/>
               </a:solidFill>
             </c:spPr>
           </c:dPt>
@@ -438,7 +438,7 @@
             <c:idx val="11"/>
             <c:spPr>
               <a:solidFill>
-                <a:srgbClr val="e03845"/>
+                <a:srgbClr val="263c5f"/>
               </a:solidFill>
             </c:spPr>
           </c:dPt>
@@ -446,7 +446,7 @@
             <c:idx val="12"/>
             <c:spPr>
               <a:solidFill>
-                <a:srgbClr val="3201ca"/>
+                <a:srgbClr val="3f3cce"/>
               </a:solidFill>
             </c:spPr>
           </c:dPt>
@@ -664,7 +664,7 @@
             <c:idx val="1"/>
             <c:spPr>
               <a:solidFill>
-                <a:srgbClr val="2d61db"/>
+                <a:srgbClr val="c4811b"/>
               </a:solidFill>
             </c:spPr>
           </c:dPt>
@@ -672,7 +672,7 @@
             <c:idx val="2"/>
             <c:spPr>
               <a:solidFill>
-                <a:srgbClr val="d0b4c5"/>
+                <a:srgbClr val="76f5ce"/>
               </a:solidFill>
             </c:spPr>
           </c:dPt>
@@ -680,7 +680,7 @@
             <c:idx val="3"/>
             <c:spPr>
               <a:solidFill>
-                <a:srgbClr val="83382a"/>
+                <a:srgbClr val="5e0f68"/>
               </a:solidFill>
             </c:spPr>
           </c:dPt>
@@ -688,7 +688,7 @@
             <c:idx val="4"/>
             <c:spPr>
               <a:solidFill>
-                <a:srgbClr val="9aabc3"/>
+                <a:srgbClr val="4c2b13"/>
               </a:solidFill>
             </c:spPr>
           </c:dPt>
@@ -696,7 +696,7 @@
             <c:idx val="5"/>
             <c:spPr>
               <a:solidFill>
-                <a:srgbClr val="6617c0"/>
+                <a:srgbClr val="aaffaa"/>
               </a:solidFill>
             </c:spPr>
           </c:dPt>
@@ -704,7 +704,7 @@
             <c:idx val="6"/>
             <c:spPr>
               <a:solidFill>
-                <a:srgbClr val="35adfa"/>
+                <a:srgbClr val="c76e06"/>
               </a:solidFill>
             </c:spPr>
           </c:dPt>
@@ -712,7 +712,7 @@
             <c:idx val="7"/>
             <c:spPr>
               <a:solidFill>
-                <a:srgbClr val="75e6a8"/>
+                <a:srgbClr val="82b317"/>
               </a:solidFill>
             </c:spPr>
           </c:dPt>
@@ -720,7 +720,7 @@
             <c:idx val="8"/>
             <c:spPr>
               <a:solidFill>
-                <a:srgbClr val="6c9eab"/>
+                <a:srgbClr val="f483d4"/>
               </a:solidFill>
             </c:spPr>
           </c:dPt>
@@ -728,7 +728,7 @@
             <c:idx val="9"/>
             <c:spPr>
               <a:solidFill>
-                <a:srgbClr val="c8cdd8"/>
+                <a:srgbClr val="c8801e"/>
               </a:solidFill>
             </c:spPr>
           </c:dPt>
@@ -736,7 +736,7 @@
             <c:idx val="10"/>
             <c:spPr>
               <a:solidFill>
-                <a:srgbClr val="e10690"/>
+                <a:srgbClr val="015fa9"/>
               </a:solidFill>
             </c:spPr>
           </c:dPt>
@@ -744,7 +744,7 @@
             <c:idx val="11"/>
             <c:spPr>
               <a:solidFill>
-                <a:srgbClr val="e03845"/>
+                <a:srgbClr val="263c5f"/>
               </a:solidFill>
             </c:spPr>
           </c:dPt>
@@ -752,7 +752,7 @@
             <c:idx val="12"/>
             <c:spPr>
               <a:solidFill>
-                <a:srgbClr val="3201ca"/>
+                <a:srgbClr val="3f3cce"/>
               </a:solidFill>
             </c:spPr>
           </c:dPt>
@@ -11773,7 +11773,7 @@
       </p:sp>
       <p:graphicFrame>
         <p:nvGraphicFramePr>
-          <p:cNvPr id="315" name="Chart 3"/>
+          <p:cNvPr id="3702" name="Chart 3"/>
           <p:cNvGraphicFramePr/>
           <p:nvPr>
                     </p:nvPr>

</xml_diff>

<commit_message>
renaming apex office print to cloud office print
</commit_message>
<xml_diff>
--- a/examples/solar_system_example/pptx/output.pptx
+++ b/examples/solar_system_example/pptx/output.pptx
@@ -358,7 +358,7 @@
             <c:idx val="1"/>
             <c:spPr>
               <a:solidFill>
-                <a:srgbClr val="383eeb"/>
+                <a:srgbClr val="824770"/>
               </a:solidFill>
             </c:spPr>
           </c:dPt>
@@ -366,7 +366,7 @@
             <c:idx val="2"/>
             <c:spPr>
               <a:solidFill>
-                <a:srgbClr val="89d11b"/>
+                <a:srgbClr val="93561a"/>
               </a:solidFill>
             </c:spPr>
           </c:dPt>
@@ -374,7 +374,7 @@
             <c:idx val="3"/>
             <c:spPr>
               <a:solidFill>
-                <a:srgbClr val="afe80c"/>
+                <a:srgbClr val="7d9b82"/>
               </a:solidFill>
             </c:spPr>
           </c:dPt>
@@ -382,7 +382,7 @@
             <c:idx val="4"/>
             <c:spPr>
               <a:solidFill>
-                <a:srgbClr val="d0663d"/>
+                <a:srgbClr val="cd2700"/>
               </a:solidFill>
             </c:spPr>
           </c:dPt>
@@ -390,7 +390,7 @@
             <c:idx val="5"/>
             <c:spPr>
               <a:solidFill>
-                <a:srgbClr val="c9afee"/>
+                <a:srgbClr val="811fcb"/>
               </a:solidFill>
             </c:spPr>
           </c:dPt>
@@ -398,7 +398,7 @@
             <c:idx val="6"/>
             <c:spPr>
               <a:solidFill>
-                <a:srgbClr val="46e0f2"/>
+                <a:srgbClr val="c55dc3"/>
               </a:solidFill>
             </c:spPr>
           </c:dPt>
@@ -406,7 +406,7 @@
             <c:idx val="7"/>
             <c:spPr>
               <a:solidFill>
-                <a:srgbClr val="9b247b"/>
+                <a:srgbClr val="0b377d"/>
               </a:solidFill>
             </c:spPr>
           </c:dPt>
@@ -414,7 +414,7 @@
             <c:idx val="8"/>
             <c:spPr>
               <a:solidFill>
-                <a:srgbClr val="192550"/>
+                <a:srgbClr val="adb7e8"/>
               </a:solidFill>
             </c:spPr>
           </c:dPt>
@@ -422,7 +422,7 @@
             <c:idx val="9"/>
             <c:spPr>
               <a:solidFill>
-                <a:srgbClr val="df93fe"/>
+                <a:srgbClr val="a63b01"/>
               </a:solidFill>
             </c:spPr>
           </c:dPt>
@@ -430,7 +430,7 @@
             <c:idx val="10"/>
             <c:spPr>
               <a:solidFill>
-                <a:srgbClr val="dc6231"/>
+                <a:srgbClr val="4b5935"/>
               </a:solidFill>
             </c:spPr>
           </c:dPt>
@@ -438,7 +438,7 @@
             <c:idx val="11"/>
             <c:spPr>
               <a:solidFill>
-                <a:srgbClr val="ec0b5b"/>
+                <a:srgbClr val="e2d683"/>
               </a:solidFill>
             </c:spPr>
           </c:dPt>
@@ -446,7 +446,7 @@
             <c:idx val="12"/>
             <c:spPr>
               <a:solidFill>
-                <a:srgbClr val="ccc019"/>
+                <a:srgbClr val="dacf6f"/>
               </a:solidFill>
             </c:spPr>
           </c:dPt>
@@ -664,7 +664,7 @@
             <c:idx val="1"/>
             <c:spPr>
               <a:solidFill>
-                <a:srgbClr val="383eeb"/>
+                <a:srgbClr val="824770"/>
               </a:solidFill>
             </c:spPr>
           </c:dPt>
@@ -672,7 +672,7 @@
             <c:idx val="2"/>
             <c:spPr>
               <a:solidFill>
-                <a:srgbClr val="89d11b"/>
+                <a:srgbClr val="93561a"/>
               </a:solidFill>
             </c:spPr>
           </c:dPt>
@@ -680,7 +680,7 @@
             <c:idx val="3"/>
             <c:spPr>
               <a:solidFill>
-                <a:srgbClr val="afe80c"/>
+                <a:srgbClr val="7d9b82"/>
               </a:solidFill>
             </c:spPr>
           </c:dPt>
@@ -688,7 +688,7 @@
             <c:idx val="4"/>
             <c:spPr>
               <a:solidFill>
-                <a:srgbClr val="d0663d"/>
+                <a:srgbClr val="cd2700"/>
               </a:solidFill>
             </c:spPr>
           </c:dPt>
@@ -696,7 +696,7 @@
             <c:idx val="5"/>
             <c:spPr>
               <a:solidFill>
-                <a:srgbClr val="c9afee"/>
+                <a:srgbClr val="811fcb"/>
               </a:solidFill>
             </c:spPr>
           </c:dPt>
@@ -704,7 +704,7 @@
             <c:idx val="6"/>
             <c:spPr>
               <a:solidFill>
-                <a:srgbClr val="46e0f2"/>
+                <a:srgbClr val="c55dc3"/>
               </a:solidFill>
             </c:spPr>
           </c:dPt>
@@ -712,7 +712,7 @@
             <c:idx val="7"/>
             <c:spPr>
               <a:solidFill>
-                <a:srgbClr val="9b247b"/>
+                <a:srgbClr val="0b377d"/>
               </a:solidFill>
             </c:spPr>
           </c:dPt>
@@ -720,7 +720,7 @@
             <c:idx val="8"/>
             <c:spPr>
               <a:solidFill>
-                <a:srgbClr val="192550"/>
+                <a:srgbClr val="adb7e8"/>
               </a:solidFill>
             </c:spPr>
           </c:dPt>
@@ -728,7 +728,7 @@
             <c:idx val="9"/>
             <c:spPr>
               <a:solidFill>
-                <a:srgbClr val="df93fe"/>
+                <a:srgbClr val="a63b01"/>
               </a:solidFill>
             </c:spPr>
           </c:dPt>
@@ -736,7 +736,7 @@
             <c:idx val="10"/>
             <c:spPr>
               <a:solidFill>
-                <a:srgbClr val="dc6231"/>
+                <a:srgbClr val="4b5935"/>
               </a:solidFill>
             </c:spPr>
           </c:dPt>
@@ -744,7 +744,7 @@
             <c:idx val="11"/>
             <c:spPr>
               <a:solidFill>
-                <a:srgbClr val="ec0b5b"/>
+                <a:srgbClr val="e2d683"/>
               </a:solidFill>
             </c:spPr>
           </c:dPt>
@@ -752,7 +752,7 @@
             <c:idx val="12"/>
             <c:spPr>
               <a:solidFill>
-                <a:srgbClr val="ccc019"/>
+                <a:srgbClr val="dacf6f"/>
               </a:solidFill>
             </c:spPr>
           </c:dPt>
@@ -11773,7 +11773,7 @@
       </p:sp>
       <p:graphicFrame>
         <p:nvGraphicFramePr>
-          <p:cNvPr id="3109" name="Chart 3"/>
+          <p:cNvPr id="3706" name="Chart 3"/>
           <p:cNvGraphicFramePr/>
           <p:nvPr>
                     </p:nvPr>

</xml_diff>